<commit_message>
updated and fix some tupo mistake
</commit_message>
<xml_diff>
--- a/slidedeck/JavaCodeQuality - Huan Mai.pptx
+++ b/slidedeck/JavaCodeQuality - Huan Mai.pptx
@@ -237,7 +237,7 @@
           <a:p>
             <a:fld id="{0D576C0E-14EB-48F6-B8DD-C2C6E1CE5186}" type="datetimeFigureOut">
               <a:rPr lang="en-US" smtClean="0"/>
-              <a:t>10/3/2016</a:t>
+              <a:t>10/13/2016</a:t>
             </a:fld>
             <a:endParaRPr lang="en-US" dirty="0"/>
           </a:p>
@@ -8888,13 +8888,13 @@
             </a:pPr>
             <a:r>
               <a:rPr lang="en-US" dirty="0">
-                <a:hlinkClick r:id="rId2" invalidUrl="https://intranet.kms-technology.com/download/attachments/6324712/KMS Java Coding Standards - v1.0.docx?api=v2"/>
+                <a:hlinkClick r:id="rId2"/>
               </a:rPr>
               <a:t>https://intranet.kms-technology.com/download/attachments/6324712/KMS%20Java%20Coding%20Standards%20-%</a:t>
             </a:r>
             <a:r>
               <a:rPr lang="en-US" dirty="0" smtClean="0">
-                <a:hlinkClick r:id="rId2" invalidUrl="https://intranet.kms-technology.com/download/attachments/6324712/KMS Java Coding Standards - v1.0.docx?api=v2"/>
+                <a:hlinkClick r:id="rId2"/>
               </a:rPr>
               <a:t>20v1.0.docx?api=v2</a:t>
             </a:r>
@@ -9539,7 +9539,6 @@
               <a:rPr lang="en-US" sz="2800" dirty="0" smtClean="0"/>
               <a:t>Java?</a:t>
             </a:r>
-            <a:endParaRPr lang="en-US" sz="2800" dirty="0" smtClean="0"/>
           </a:p>
           <a:p>
             <a:pPr marL="514350" indent="-514350">
@@ -9548,11 +9547,7 @@
             </a:pPr>
             <a:r>
               <a:rPr lang="en-US" sz="2800" dirty="0" smtClean="0"/>
-              <a:t>What </a:t>
-            </a:r>
-            <a:r>
-              <a:rPr lang="en-US" sz="2800" dirty="0" smtClean="0"/>
-              <a:t>and Why is </a:t>
+              <a:t>What and Why is </a:t>
             </a:r>
             <a:r>
               <a:rPr lang="en-US" sz="2800" dirty="0"/>
@@ -9562,7 +9557,6 @@
               <a:rPr lang="en-US" sz="2800" dirty="0" smtClean="0"/>
               <a:t>?</a:t>
             </a:r>
-            <a:endParaRPr lang="en-US" sz="2800" dirty="0" smtClean="0"/>
           </a:p>
           <a:p>
             <a:pPr marL="514350" indent="-514350">
@@ -10007,11 +10001,7 @@
           <a:p>
             <a:r>
               <a:rPr lang="en-US" dirty="0"/>
-              <a:t>What </a:t>
-            </a:r>
-            <a:r>
-              <a:rPr lang="en-US" dirty="0"/>
-              <a:t>&amp;</a:t>
+              <a:t>What &amp;</a:t>
             </a:r>
             <a:r>
               <a:rPr lang="en-US" dirty="0" smtClean="0"/>
@@ -10019,15 +10009,7 @@
             </a:r>
             <a:r>
               <a:rPr lang="en-US" dirty="0"/>
-              <a:t>Why is </a:t>
-            </a:r>
-            <a:r>
-              <a:rPr lang="en-US" dirty="0"/>
-              <a:t>Java Coding Quality?</a:t>
-            </a:r>
-            <a:r>
-              <a:rPr lang="en-US" dirty="0"/>
-              <a:t/>
+              <a:t>Why is Java Coding Quality?</a:t>
             </a:r>
             <a:br>
               <a:rPr lang="en-US" dirty="0"/>
@@ -10102,8 +10084,20 @@
             <a:pPr lvl="1"/>
             <a:r>
               <a:rPr lang="en-US" sz="3200" dirty="0" smtClean="0"/>
-              <a:t>Clean code</a:t>
-            </a:r>
+              <a:t>Clean </a:t>
+            </a:r>
+            <a:r>
+              <a:rPr lang="en-US" sz="3200" dirty="0" smtClean="0"/>
+              <a:t>code</a:t>
+            </a:r>
+          </a:p>
+          <a:p>
+            <a:pPr lvl="1"/>
+            <a:r>
+              <a:rPr lang="en-US" sz="3200" dirty="0" smtClean="0"/>
+              <a:t>Secure</a:t>
+            </a:r>
+            <a:endParaRPr lang="en-US" sz="3200" dirty="0" smtClean="0"/>
           </a:p>
           <a:p>
             <a:r>
@@ -10119,7 +10113,19 @@
             <a:pPr lvl="1"/>
             <a:r>
               <a:rPr lang="en-US" sz="3200" dirty="0" smtClean="0"/>
-              <a:t>Less bugs and easier to maintainable</a:t>
+              <a:t>Less </a:t>
+            </a:r>
+            <a:r>
+              <a:rPr lang="en-US" sz="3200" dirty="0" smtClean="0"/>
+              <a:t>bug </a:t>
+            </a:r>
+            <a:r>
+              <a:rPr lang="en-US" sz="3200" dirty="0" smtClean="0"/>
+              <a:t>and easier to </a:t>
+            </a:r>
+            <a:r>
+              <a:rPr lang="en-US" sz="3200" dirty="0" smtClean="0"/>
+              <a:t>maintain</a:t>
             </a:r>
             <a:endParaRPr lang="en-US" sz="3200" dirty="0" smtClean="0"/>
           </a:p>
@@ -10266,33 +10272,15 @@
                                   </p:childTnLst>
                                 </p:cTn>
                               </p:par>
-                            </p:childTnLst>
-                          </p:cTn>
-                        </p:par>
-                      </p:childTnLst>
-                    </p:cTn>
-                  </p:par>
-                  <p:par>
-                    <p:cTn id="13" fill="hold">
-                      <p:stCondLst>
-                        <p:cond delay="indefinite"/>
-                      </p:stCondLst>
-                      <p:childTnLst>
-                        <p:par>
-                          <p:cTn id="14" fill="hold">
-                            <p:stCondLst>
-                              <p:cond delay="0"/>
-                            </p:stCondLst>
-                            <p:childTnLst>
                               <p:par>
-                                <p:cTn id="15" presetID="1" presetClass="entr" presetSubtype="0" fill="hold" nodeType="clickEffect">
+                                <p:cTn id="13" presetID="1" presetClass="entr" presetSubtype="0" fill="hold" nodeType="withEffect">
                                   <p:stCondLst>
                                     <p:cond delay="0"/>
                                   </p:stCondLst>
                                   <p:childTnLst>
                                     <p:set>
                                       <p:cBhvr>
-                                        <p:cTn id="16" dur="1" fill="hold">
+                                        <p:cTn id="14" dur="1" fill="hold">
                                           <p:stCondLst>
                                             <p:cond delay="0"/>
                                           </p:stCondLst>
@@ -10322,26 +10310,26 @@
                     </p:cTn>
                   </p:par>
                   <p:par>
-                    <p:cTn id="17" fill="hold">
+                    <p:cTn id="15" fill="hold">
                       <p:stCondLst>
                         <p:cond delay="indefinite"/>
                       </p:stCondLst>
                       <p:childTnLst>
                         <p:par>
-                          <p:cTn id="18" fill="hold">
+                          <p:cTn id="16" fill="hold">
                             <p:stCondLst>
                               <p:cond delay="0"/>
                             </p:stCondLst>
                             <p:childTnLst>
                               <p:par>
-                                <p:cTn id="19" presetID="1" presetClass="entr" presetSubtype="0" fill="hold" nodeType="clickEffect">
+                                <p:cTn id="17" presetID="1" presetClass="entr" presetSubtype="0" fill="hold" nodeType="clickEffect">
                                   <p:stCondLst>
                                     <p:cond delay="0"/>
                                   </p:stCondLst>
                                   <p:childTnLst>
                                     <p:set>
                                       <p:cBhvr>
-                                        <p:cTn id="20" dur="1" fill="hold">
+                                        <p:cTn id="18" dur="1" fill="hold">
                                           <p:stCondLst>
                                             <p:cond delay="0"/>
                                           </p:stCondLst>
@@ -10350,6 +10338,55 @@
                                           <p:spTgt spid="3">
                                             <p:txEl>
                                               <p:pRg st="4" end="4"/>
+                                            </p:txEl>
+                                          </p:spTgt>
+                                        </p:tgtEl>
+                                        <p:attrNameLst>
+                                          <p:attrName>style.visibility</p:attrName>
+                                        </p:attrNameLst>
+                                      </p:cBhvr>
+                                      <p:to>
+                                        <p:strVal val="visible"/>
+                                      </p:to>
+                                    </p:set>
+                                  </p:childTnLst>
+                                </p:cTn>
+                              </p:par>
+                            </p:childTnLst>
+                          </p:cTn>
+                        </p:par>
+                      </p:childTnLst>
+                    </p:cTn>
+                  </p:par>
+                  <p:par>
+                    <p:cTn id="19" fill="hold">
+                      <p:stCondLst>
+                        <p:cond delay="indefinite"/>
+                      </p:stCondLst>
+                      <p:childTnLst>
+                        <p:par>
+                          <p:cTn id="20" fill="hold">
+                            <p:stCondLst>
+                              <p:cond delay="0"/>
+                            </p:stCondLst>
+                            <p:childTnLst>
+                              <p:par>
+                                <p:cTn id="21" presetID="1" presetClass="entr" presetSubtype="0" fill="hold" nodeType="clickEffect">
+                                  <p:stCondLst>
+                                    <p:cond delay="0"/>
+                                  </p:stCondLst>
+                                  <p:childTnLst>
+                                    <p:set>
+                                      <p:cBhvr>
+                                        <p:cTn id="22" dur="1" fill="hold">
+                                          <p:stCondLst>
+                                            <p:cond delay="0"/>
+                                          </p:stCondLst>
+                                        </p:cTn>
+                                        <p:tgtEl>
+                                          <p:spTgt spid="3">
+                                            <p:txEl>
+                                              <p:pRg st="5" end="5"/>
                                             </p:txEl>
                                           </p:spTgt>
                                         </p:tgtEl>

</xml_diff>